<commit_message>
some typos are corrected in week2's slides
</commit_message>
<xml_diff>
--- a/Lectures 2023/CITS5503AWSIntro_week2.pptx
+++ b/Lectures 2023/CITS5503AWSIntro_week2.pptx
@@ -21265,7 +21265,7 @@
           </a:ln>
           <a:extLst>
             <a:ext uri="{C572A759-6A51-4108-AA02-DFA0A04FC94B}">
-              <ma14:wrappingTextBoxFlag xmlns:ma14="http://schemas.microsoft.com/office/mac/drawingml/2011/main" xmlns:a14="http://schemas.microsoft.com/office/drawing/2010/main" xmlns:m="http://schemas.openxmlformats.org/officeDocument/2006/math" xmlns="" val="1"/>
+              <ma14:wrappingTextBoxFlag xmlns="" xmlns:m="http://schemas.openxmlformats.org/officeDocument/2006/math" xmlns:a14="http://schemas.microsoft.com/office/drawing/2010/main" xmlns:ma14="http://schemas.microsoft.com/office/mac/drawingml/2011/main" val="1"/>
             </a:ext>
           </a:extLst>
         </p:spPr>
@@ -21381,7 +21381,7 @@
             <a:effectLst/>
             <a:extLst>
               <a:ext uri="{C572A759-6A51-4108-AA02-DFA0A04FC94B}">
-                <ma14:wrappingTextBoxFlag xmlns:ma14="http://schemas.microsoft.com/office/mac/drawingml/2011/main" xmlns:a14="http://schemas.microsoft.com/office/drawing/2010/main" xmlns:m="http://schemas.openxmlformats.org/officeDocument/2006/math" xmlns="" val="1"/>
+                <ma14:wrappingTextBoxFlag xmlns="" xmlns:m="http://schemas.openxmlformats.org/officeDocument/2006/math" xmlns:a14="http://schemas.microsoft.com/office/drawing/2010/main" xmlns:ma14="http://schemas.microsoft.com/office/mac/drawingml/2011/main" val="1"/>
               </a:ext>
             </a:extLst>
           </p:spPr>
@@ -21493,7 +21493,7 @@
             <a:effectLst/>
             <a:extLst>
               <a:ext uri="{C572A759-6A51-4108-AA02-DFA0A04FC94B}">
-                <ma14:wrappingTextBoxFlag xmlns:ma14="http://schemas.microsoft.com/office/mac/drawingml/2011/main" xmlns:a14="http://schemas.microsoft.com/office/drawing/2010/main" xmlns:m="http://schemas.openxmlformats.org/officeDocument/2006/math" xmlns="" val="1"/>
+                <ma14:wrappingTextBoxFlag xmlns="" xmlns:m="http://schemas.openxmlformats.org/officeDocument/2006/math" xmlns:a14="http://schemas.microsoft.com/office/drawing/2010/main" xmlns:ma14="http://schemas.microsoft.com/office/mac/drawingml/2011/main" val="1"/>
               </a:ext>
             </a:extLst>
           </p:spPr>
@@ -21605,7 +21605,7 @@
             <a:effectLst/>
             <a:extLst>
               <a:ext uri="{C572A759-6A51-4108-AA02-DFA0A04FC94B}">
-                <ma14:wrappingTextBoxFlag xmlns:ma14="http://schemas.microsoft.com/office/mac/drawingml/2011/main" xmlns:a14="http://schemas.microsoft.com/office/drawing/2010/main" xmlns:m="http://schemas.openxmlformats.org/officeDocument/2006/math" xmlns="" val="1"/>
+                <ma14:wrappingTextBoxFlag xmlns="" xmlns:m="http://schemas.openxmlformats.org/officeDocument/2006/math" xmlns:a14="http://schemas.microsoft.com/office/drawing/2010/main" xmlns:ma14="http://schemas.microsoft.com/office/mac/drawingml/2011/main" val="1"/>
               </a:ext>
             </a:extLst>
           </p:spPr>
@@ -22311,7 +22311,7 @@
             <a:effectLst/>
             <a:extLst>
               <a:ext uri="{C572A759-6A51-4108-AA02-DFA0A04FC94B}">
-                <ma14:wrappingTextBoxFlag xmlns:ma14="http://schemas.microsoft.com/office/mac/drawingml/2011/main" xmlns:a14="http://schemas.microsoft.com/office/drawing/2010/main" xmlns:m="http://schemas.openxmlformats.org/officeDocument/2006/math" xmlns="" val="1"/>
+                <ma14:wrappingTextBoxFlag xmlns="" xmlns:m="http://schemas.openxmlformats.org/officeDocument/2006/math" xmlns:a14="http://schemas.microsoft.com/office/drawing/2010/main" xmlns:ma14="http://schemas.microsoft.com/office/mac/drawingml/2011/main" val="1"/>
               </a:ext>
             </a:extLst>
           </p:spPr>
@@ -22426,7 +22426,7 @@
             <a:effectLst/>
             <a:extLst>
               <a:ext uri="{C572A759-6A51-4108-AA02-DFA0A04FC94B}">
-                <ma14:wrappingTextBoxFlag xmlns:ma14="http://schemas.microsoft.com/office/mac/drawingml/2011/main" xmlns:a14="http://schemas.microsoft.com/office/drawing/2010/main" xmlns:m="http://schemas.openxmlformats.org/officeDocument/2006/math" xmlns="" val="1"/>
+                <ma14:wrappingTextBoxFlag xmlns="" xmlns:m="http://schemas.openxmlformats.org/officeDocument/2006/math" xmlns:a14="http://schemas.microsoft.com/office/drawing/2010/main" xmlns:ma14="http://schemas.microsoft.com/office/mac/drawingml/2011/main" val="1"/>
               </a:ext>
             </a:extLst>
           </p:spPr>
@@ -22541,7 +22541,7 @@
             <a:effectLst/>
             <a:extLst>
               <a:ext uri="{C572A759-6A51-4108-AA02-DFA0A04FC94B}">
-                <ma14:wrappingTextBoxFlag xmlns:ma14="http://schemas.microsoft.com/office/mac/drawingml/2011/main" xmlns:a14="http://schemas.microsoft.com/office/drawing/2010/main" xmlns:m="http://schemas.openxmlformats.org/officeDocument/2006/math" xmlns="" val="1"/>
+                <ma14:wrappingTextBoxFlag xmlns="" xmlns:m="http://schemas.openxmlformats.org/officeDocument/2006/math" xmlns:a14="http://schemas.microsoft.com/office/drawing/2010/main" xmlns:ma14="http://schemas.microsoft.com/office/mac/drawingml/2011/main" val="1"/>
               </a:ext>
             </a:extLst>
           </p:spPr>
@@ -22793,7 +22793,7 @@
           </a:ln>
           <a:extLst>
             <a:ext uri="{C572A759-6A51-4108-AA02-DFA0A04FC94B}">
-              <ma14:wrappingTextBoxFlag xmlns:ma14="http://schemas.microsoft.com/office/mac/drawingml/2011/main" xmlns:a14="http://schemas.microsoft.com/office/drawing/2010/main" xmlns:m="http://schemas.openxmlformats.org/officeDocument/2006/math" xmlns="" val="1"/>
+              <ma14:wrappingTextBoxFlag xmlns="" xmlns:m="http://schemas.openxmlformats.org/officeDocument/2006/math" xmlns:a14="http://schemas.microsoft.com/office/drawing/2010/main" xmlns:ma14="http://schemas.microsoft.com/office/mac/drawingml/2011/main" val="1"/>
             </a:ext>
           </a:extLst>
         </p:spPr>
@@ -23416,7 +23416,7 @@
             <a:effectLst/>
             <a:extLst>
               <a:ext uri="{C572A759-6A51-4108-AA02-DFA0A04FC94B}">
-                <ma14:wrappingTextBoxFlag xmlns:ma14="http://schemas.microsoft.com/office/mac/drawingml/2011/main" xmlns:a14="http://schemas.microsoft.com/office/drawing/2010/main" xmlns:m="http://schemas.openxmlformats.org/officeDocument/2006/math" xmlns="" val="1"/>
+                <ma14:wrappingTextBoxFlag xmlns="" xmlns:m="http://schemas.openxmlformats.org/officeDocument/2006/math" xmlns:a14="http://schemas.microsoft.com/office/drawing/2010/main" xmlns:ma14="http://schemas.microsoft.com/office/mac/drawingml/2011/main" val="1"/>
               </a:ext>
             </a:extLst>
           </p:spPr>
@@ -23549,7 +23549,7 @@
             <a:effectLst/>
             <a:extLst>
               <a:ext uri="{C572A759-6A51-4108-AA02-DFA0A04FC94B}">
-                <ma14:wrappingTextBoxFlag xmlns:ma14="http://schemas.microsoft.com/office/mac/drawingml/2011/main" xmlns:a14="http://schemas.microsoft.com/office/drawing/2010/main" xmlns:m="http://schemas.openxmlformats.org/officeDocument/2006/math" xmlns="" val="1"/>
+                <ma14:wrappingTextBoxFlag xmlns="" xmlns:m="http://schemas.openxmlformats.org/officeDocument/2006/math" xmlns:a14="http://schemas.microsoft.com/office/drawing/2010/main" xmlns:ma14="http://schemas.microsoft.com/office/mac/drawingml/2011/main" val="1"/>
               </a:ext>
             </a:extLst>
           </p:spPr>
@@ -23682,7 +23682,7 @@
             <a:effectLst/>
             <a:extLst>
               <a:ext uri="{C572A759-6A51-4108-AA02-DFA0A04FC94B}">
-                <ma14:wrappingTextBoxFlag xmlns:ma14="http://schemas.microsoft.com/office/mac/drawingml/2011/main" xmlns:a14="http://schemas.microsoft.com/office/drawing/2010/main" xmlns:m="http://schemas.openxmlformats.org/officeDocument/2006/math" xmlns="" val="1"/>
+                <ma14:wrappingTextBoxFlag xmlns="" xmlns:m="http://schemas.openxmlformats.org/officeDocument/2006/math" xmlns:a14="http://schemas.microsoft.com/office/drawing/2010/main" xmlns:ma14="http://schemas.microsoft.com/office/mac/drawingml/2011/main" val="1"/>
               </a:ext>
             </a:extLst>
           </p:spPr>
@@ -23964,7 +23964,7 @@
           </a:ln>
           <a:extLst>
             <a:ext uri="{C572A759-6A51-4108-AA02-DFA0A04FC94B}">
-              <ma14:wrappingTextBoxFlag xmlns:ma14="http://schemas.microsoft.com/office/mac/drawingml/2011/main" xmlns:a14="http://schemas.microsoft.com/office/drawing/2010/main" xmlns:m="http://schemas.openxmlformats.org/officeDocument/2006/math" xmlns="" val="1"/>
+              <ma14:wrappingTextBoxFlag xmlns="" xmlns:m="http://schemas.openxmlformats.org/officeDocument/2006/math" xmlns:a14="http://schemas.microsoft.com/office/drawing/2010/main" xmlns:ma14="http://schemas.microsoft.com/office/mac/drawingml/2011/main" val="1"/>
             </a:ext>
           </a:extLst>
         </p:spPr>
@@ -25711,7 +25711,7 @@
           </a:ln>
           <a:extLst>
             <a:ext uri="{C572A759-6A51-4108-AA02-DFA0A04FC94B}">
-              <ma14:wrappingTextBoxFlag xmlns:ma14="http://schemas.microsoft.com/office/mac/drawingml/2011/main" xmlns:a14="http://schemas.microsoft.com/office/drawing/2010/main" xmlns:m="http://schemas.openxmlformats.org/officeDocument/2006/math" xmlns="" val="1"/>
+              <ma14:wrappingTextBoxFlag xmlns="" xmlns:m="http://schemas.openxmlformats.org/officeDocument/2006/math" xmlns:a14="http://schemas.microsoft.com/office/drawing/2010/main" xmlns:ma14="http://schemas.microsoft.com/office/mac/drawingml/2011/main" val="1"/>
             </a:ext>
           </a:extLst>
         </p:spPr>
@@ -25771,7 +25771,7 @@
           </a:ln>
           <a:extLst>
             <a:ext uri="{C572A759-6A51-4108-AA02-DFA0A04FC94B}">
-              <ma14:wrappingTextBoxFlag xmlns:ma14="http://schemas.microsoft.com/office/mac/drawingml/2011/main" xmlns:a14="http://schemas.microsoft.com/office/drawing/2010/main" xmlns:m="http://schemas.openxmlformats.org/officeDocument/2006/math" xmlns="" val="1"/>
+              <ma14:wrappingTextBoxFlag xmlns="" xmlns:m="http://schemas.openxmlformats.org/officeDocument/2006/math" xmlns:a14="http://schemas.microsoft.com/office/drawing/2010/main" xmlns:ma14="http://schemas.microsoft.com/office/mac/drawingml/2011/main" val="1"/>
             </a:ext>
           </a:extLst>
         </p:spPr>
@@ -26642,7 +26642,7 @@
           </a:ln>
           <a:extLst>
             <a:ext uri="{C572A759-6A51-4108-AA02-DFA0A04FC94B}">
-              <ma14:wrappingTextBoxFlag xmlns:ma14="http://schemas.microsoft.com/office/mac/drawingml/2011/main" xmlns:a14="http://schemas.microsoft.com/office/drawing/2010/main" xmlns:m="http://schemas.openxmlformats.org/officeDocument/2006/math" xmlns="" val="1"/>
+              <ma14:wrappingTextBoxFlag xmlns="" xmlns:m="http://schemas.openxmlformats.org/officeDocument/2006/math" xmlns:a14="http://schemas.microsoft.com/office/drawing/2010/main" xmlns:ma14="http://schemas.microsoft.com/office/mac/drawingml/2011/main" val="1"/>
             </a:ext>
           </a:extLst>
         </p:spPr>
@@ -26692,7 +26692,7 @@
           </a:ln>
           <a:extLst>
             <a:ext uri="{C572A759-6A51-4108-AA02-DFA0A04FC94B}">
-              <ma14:wrappingTextBoxFlag xmlns:ma14="http://schemas.microsoft.com/office/mac/drawingml/2011/main" xmlns:a14="http://schemas.microsoft.com/office/drawing/2010/main" xmlns:m="http://schemas.openxmlformats.org/officeDocument/2006/math" xmlns="" val="1"/>
+              <ma14:wrappingTextBoxFlag xmlns="" xmlns:m="http://schemas.openxmlformats.org/officeDocument/2006/math" xmlns:a14="http://schemas.microsoft.com/office/drawing/2010/main" xmlns:ma14="http://schemas.microsoft.com/office/mac/drawingml/2011/main" val="1"/>
             </a:ext>
           </a:extLst>
         </p:spPr>
@@ -26742,7 +26742,7 @@
           </a:ln>
           <a:extLst>
             <a:ext uri="{C572A759-6A51-4108-AA02-DFA0A04FC94B}">
-              <ma14:wrappingTextBoxFlag xmlns:ma14="http://schemas.microsoft.com/office/mac/drawingml/2011/main" xmlns:a14="http://schemas.microsoft.com/office/drawing/2010/main" xmlns:m="http://schemas.openxmlformats.org/officeDocument/2006/math" xmlns="" val="1"/>
+              <ma14:wrappingTextBoxFlag xmlns="" xmlns:m="http://schemas.openxmlformats.org/officeDocument/2006/math" xmlns:a14="http://schemas.microsoft.com/office/drawing/2010/main" xmlns:ma14="http://schemas.microsoft.com/office/mac/drawingml/2011/main" val="1"/>
             </a:ext>
           </a:extLst>
         </p:spPr>
@@ -29874,7 +29874,7 @@
           </a:ln>
           <a:extLst>
             <a:ext uri="{C572A759-6A51-4108-AA02-DFA0A04FC94B}">
-              <ma14:wrappingTextBoxFlag xmlns="" xmlns:m="http://schemas.openxmlformats.org/officeDocument/2006/math" xmlns:a14="http://schemas.microsoft.com/office/drawing/2010/main" xmlns:ma14="http://schemas.microsoft.com/office/mac/drawingml/2011/main" val="1"/>
+              <ma14:wrappingTextBoxFlag xmlns:ma14="http://schemas.microsoft.com/office/mac/drawingml/2011/main" xmlns:a14="http://schemas.microsoft.com/office/drawing/2010/main" xmlns:m="http://schemas.openxmlformats.org/officeDocument/2006/math" xmlns="" val="1"/>
             </a:ext>
           </a:extLst>
         </p:spPr>
@@ -30273,7 +30273,7 @@
           </a:ln>
           <a:extLst>
             <a:ext uri="{C572A759-6A51-4108-AA02-DFA0A04FC94B}">
-              <ma14:wrappingTextBoxFlag xmlns="" xmlns:m="http://schemas.openxmlformats.org/officeDocument/2006/math" xmlns:a14="http://schemas.microsoft.com/office/drawing/2010/main" xmlns:ma14="http://schemas.microsoft.com/office/mac/drawingml/2011/main" val="1"/>
+              <ma14:wrappingTextBoxFlag xmlns:ma14="http://schemas.microsoft.com/office/mac/drawingml/2011/main" xmlns:a14="http://schemas.microsoft.com/office/drawing/2010/main" xmlns:m="http://schemas.openxmlformats.org/officeDocument/2006/math" xmlns="" val="1"/>
             </a:ext>
           </a:extLst>
         </p:spPr>
@@ -30321,7 +30321,7 @@
           </a:ln>
           <a:extLst>
             <a:ext uri="{C572A759-6A51-4108-AA02-DFA0A04FC94B}">
-              <ma14:wrappingTextBoxFlag xmlns="" xmlns:m="http://schemas.openxmlformats.org/officeDocument/2006/math" xmlns:a14="http://schemas.microsoft.com/office/drawing/2010/main" xmlns:ma14="http://schemas.microsoft.com/office/mac/drawingml/2011/main" val="1"/>
+              <ma14:wrappingTextBoxFlag xmlns:ma14="http://schemas.microsoft.com/office/mac/drawingml/2011/main" xmlns:a14="http://schemas.microsoft.com/office/drawing/2010/main" xmlns:m="http://schemas.openxmlformats.org/officeDocument/2006/math" xmlns="" val="1"/>
             </a:ext>
           </a:extLst>
         </p:spPr>
@@ -30369,7 +30369,7 @@
           </a:ln>
           <a:extLst>
             <a:ext uri="{C572A759-6A51-4108-AA02-DFA0A04FC94B}">
-              <ma14:wrappingTextBoxFlag xmlns="" xmlns:m="http://schemas.openxmlformats.org/officeDocument/2006/math" xmlns:a14="http://schemas.microsoft.com/office/drawing/2010/main" xmlns:ma14="http://schemas.microsoft.com/office/mac/drawingml/2011/main" val="1"/>
+              <ma14:wrappingTextBoxFlag xmlns:ma14="http://schemas.microsoft.com/office/mac/drawingml/2011/main" xmlns:a14="http://schemas.microsoft.com/office/drawing/2010/main" xmlns:m="http://schemas.openxmlformats.org/officeDocument/2006/math" xmlns="" val="1"/>
             </a:ext>
           </a:extLst>
         </p:spPr>
@@ -32184,7 +32184,7 @@
           </a:ln>
           <a:extLst>
             <a:ext uri="{C572A759-6A51-4108-AA02-DFA0A04FC94B}">
-              <ma14:wrappingTextBoxFlag xmlns="" xmlns:m="http://schemas.openxmlformats.org/officeDocument/2006/math" xmlns:a14="http://schemas.microsoft.com/office/drawing/2010/main" xmlns:ma14="http://schemas.microsoft.com/office/mac/drawingml/2011/main" val="1"/>
+              <ma14:wrappingTextBoxFlag xmlns:ma14="http://schemas.microsoft.com/office/mac/drawingml/2011/main" xmlns:a14="http://schemas.microsoft.com/office/drawing/2010/main" xmlns:m="http://schemas.openxmlformats.org/officeDocument/2006/math" xmlns="" val="1"/>
             </a:ext>
           </a:extLst>
         </p:spPr>
@@ -34511,7 +34511,15 @@
             </a:pPr>
             <a:r>
               <a:rPr lang="en-US" sz="2000" dirty="0"/>
-              <a:t>Bob is assigned with 8 vCPU and 32 GB of guest physical memory</a:t>
+              <a:t>Bob is assigned with </a:t>
+            </a:r>
+            <a:r>
+              <a:rPr lang="en-US" sz="2000"/>
+              <a:t>8 vCPUs </a:t>
+            </a:r>
+            <a:r>
+              <a:rPr lang="en-US" sz="2000" dirty="0"/>
+              <a:t>and 32 GB of guest physical memory</a:t>
             </a:r>
           </a:p>
           <a:p>
@@ -34551,7 +34559,7 @@
             </a:pPr>
             <a:r>
               <a:rPr lang="en-US" sz="2000" dirty="0"/>
-              <a:t>Daniel is assigned with 4 CPUs and 8 GB of guest physical memory</a:t>
+              <a:t>Daniel is assigned with 4 vCPUs and 8 GB of guest physical memory</a:t>
             </a:r>
             <a:endParaRPr lang="en-AU" sz="2000" dirty="0"/>
           </a:p>
@@ -34717,7 +34725,7 @@
           </a:ln>
           <a:extLst>
             <a:ext uri="{C572A759-6A51-4108-AA02-DFA0A04FC94B}">
-              <ma14:wrappingTextBoxFlag xmlns="" xmlns:m="http://schemas.openxmlformats.org/officeDocument/2006/math" xmlns:a14="http://schemas.microsoft.com/office/drawing/2010/main" xmlns:ma14="http://schemas.microsoft.com/office/mac/drawingml/2011/main" val="1"/>
+              <ma14:wrappingTextBoxFlag xmlns:ma14="http://schemas.microsoft.com/office/mac/drawingml/2011/main" xmlns:a14="http://schemas.microsoft.com/office/drawing/2010/main" xmlns:m="http://schemas.openxmlformats.org/officeDocument/2006/math" xmlns="" val="1"/>
             </a:ext>
           </a:extLst>
         </p:spPr>
@@ -35116,7 +35124,7 @@
           </a:ln>
           <a:extLst>
             <a:ext uri="{C572A759-6A51-4108-AA02-DFA0A04FC94B}">
-              <ma14:wrappingTextBoxFlag xmlns="" xmlns:m="http://schemas.openxmlformats.org/officeDocument/2006/math" xmlns:a14="http://schemas.microsoft.com/office/drawing/2010/main" xmlns:ma14="http://schemas.microsoft.com/office/mac/drawingml/2011/main" val="1"/>
+              <ma14:wrappingTextBoxFlag xmlns:ma14="http://schemas.microsoft.com/office/mac/drawingml/2011/main" xmlns:a14="http://schemas.microsoft.com/office/drawing/2010/main" xmlns:m="http://schemas.openxmlformats.org/officeDocument/2006/math" xmlns="" val="1"/>
             </a:ext>
           </a:extLst>
         </p:spPr>
@@ -35164,7 +35172,7 @@
           </a:ln>
           <a:extLst>
             <a:ext uri="{C572A759-6A51-4108-AA02-DFA0A04FC94B}">
-              <ma14:wrappingTextBoxFlag xmlns="" xmlns:m="http://schemas.openxmlformats.org/officeDocument/2006/math" xmlns:a14="http://schemas.microsoft.com/office/drawing/2010/main" xmlns:ma14="http://schemas.microsoft.com/office/mac/drawingml/2011/main" val="1"/>
+              <ma14:wrappingTextBoxFlag xmlns:ma14="http://schemas.microsoft.com/office/mac/drawingml/2011/main" xmlns:a14="http://schemas.microsoft.com/office/drawing/2010/main" xmlns:m="http://schemas.openxmlformats.org/officeDocument/2006/math" xmlns="" val="1"/>
             </a:ext>
           </a:extLst>
         </p:spPr>
@@ -35212,7 +35220,7 @@
           </a:ln>
           <a:extLst>
             <a:ext uri="{C572A759-6A51-4108-AA02-DFA0A04FC94B}">
-              <ma14:wrappingTextBoxFlag xmlns="" xmlns:m="http://schemas.openxmlformats.org/officeDocument/2006/math" xmlns:a14="http://schemas.microsoft.com/office/drawing/2010/main" xmlns:ma14="http://schemas.microsoft.com/office/mac/drawingml/2011/main" val="1"/>
+              <ma14:wrappingTextBoxFlag xmlns:ma14="http://schemas.microsoft.com/office/mac/drawingml/2011/main" xmlns:a14="http://schemas.microsoft.com/office/drawing/2010/main" xmlns:m="http://schemas.openxmlformats.org/officeDocument/2006/math" xmlns="" val="1"/>
             </a:ext>
           </a:extLst>
         </p:spPr>
@@ -35445,7 +35453,7 @@
           </a:ln>
           <a:extLst>
             <a:ext uri="{C572A759-6A51-4108-AA02-DFA0A04FC94B}">
-              <ma14:wrappingTextBoxFlag xmlns="" xmlns:m="http://schemas.openxmlformats.org/officeDocument/2006/math" xmlns:a14="http://schemas.microsoft.com/office/drawing/2010/main" xmlns:ma14="http://schemas.microsoft.com/office/mac/drawingml/2011/main" val="1"/>
+              <ma14:wrappingTextBoxFlag xmlns:ma14="http://schemas.microsoft.com/office/mac/drawingml/2011/main" xmlns:a14="http://schemas.microsoft.com/office/drawing/2010/main" xmlns:m="http://schemas.openxmlformats.org/officeDocument/2006/math" xmlns="" val="1"/>
             </a:ext>
           </a:extLst>
         </p:spPr>
@@ -35493,7 +35501,7 @@
           </a:ln>
           <a:extLst>
             <a:ext uri="{C572A759-6A51-4108-AA02-DFA0A04FC94B}">
-              <ma14:wrappingTextBoxFlag xmlns="" xmlns:m="http://schemas.openxmlformats.org/officeDocument/2006/math" xmlns:a14="http://schemas.microsoft.com/office/drawing/2010/main" xmlns:ma14="http://schemas.microsoft.com/office/mac/drawingml/2011/main" val="1"/>
+              <ma14:wrappingTextBoxFlag xmlns:ma14="http://schemas.microsoft.com/office/mac/drawingml/2011/main" xmlns:a14="http://schemas.microsoft.com/office/drawing/2010/main" xmlns:m="http://schemas.openxmlformats.org/officeDocument/2006/math" xmlns="" val="1"/>
             </a:ext>
           </a:extLst>
         </p:spPr>
@@ -35806,7 +35814,7 @@
           </a:ln>
           <a:extLst>
             <a:ext uri="{C572A759-6A51-4108-AA02-DFA0A04FC94B}">
-              <ma14:wrappingTextBoxFlag xmlns="" xmlns:m="http://schemas.openxmlformats.org/officeDocument/2006/math" xmlns:a14="http://schemas.microsoft.com/office/drawing/2010/main" xmlns:ma14="http://schemas.microsoft.com/office/mac/drawingml/2011/main" val="1"/>
+              <ma14:wrappingTextBoxFlag xmlns:ma14="http://schemas.microsoft.com/office/mac/drawingml/2011/main" xmlns:a14="http://schemas.microsoft.com/office/drawing/2010/main" xmlns:m="http://schemas.openxmlformats.org/officeDocument/2006/math" xmlns="" val="1"/>
             </a:ext>
           </a:extLst>
         </p:spPr>
@@ -41380,7 +41388,7 @@
           </a:ln>
           <a:extLst>
             <a:ext uri="{C572A759-6A51-4108-AA02-DFA0A04FC94B}">
-              <ma14:wrappingTextBoxFlag xmlns="" xmlns:m="http://schemas.openxmlformats.org/officeDocument/2006/math" xmlns:a14="http://schemas.microsoft.com/office/drawing/2010/main" xmlns:ma14="http://schemas.microsoft.com/office/mac/drawingml/2011/main" val="1"/>
+              <ma14:wrappingTextBoxFlag xmlns:ma14="http://schemas.microsoft.com/office/mac/drawingml/2011/main" xmlns:a14="http://schemas.microsoft.com/office/drawing/2010/main" xmlns:m="http://schemas.openxmlformats.org/officeDocument/2006/math" xmlns="" val="1"/>
             </a:ext>
           </a:extLst>
         </p:spPr>
@@ -41779,7 +41787,7 @@
           </a:ln>
           <a:extLst>
             <a:ext uri="{C572A759-6A51-4108-AA02-DFA0A04FC94B}">
-              <ma14:wrappingTextBoxFlag xmlns="" xmlns:m="http://schemas.openxmlformats.org/officeDocument/2006/math" xmlns:a14="http://schemas.microsoft.com/office/drawing/2010/main" xmlns:ma14="http://schemas.microsoft.com/office/mac/drawingml/2011/main" val="1"/>
+              <ma14:wrappingTextBoxFlag xmlns:ma14="http://schemas.microsoft.com/office/mac/drawingml/2011/main" xmlns:a14="http://schemas.microsoft.com/office/drawing/2010/main" xmlns:m="http://schemas.openxmlformats.org/officeDocument/2006/math" xmlns="" val="1"/>
             </a:ext>
           </a:extLst>
         </p:spPr>
@@ -41827,7 +41835,7 @@
           </a:ln>
           <a:extLst>
             <a:ext uri="{C572A759-6A51-4108-AA02-DFA0A04FC94B}">
-              <ma14:wrappingTextBoxFlag xmlns="" xmlns:m="http://schemas.openxmlformats.org/officeDocument/2006/math" xmlns:a14="http://schemas.microsoft.com/office/drawing/2010/main" xmlns:ma14="http://schemas.microsoft.com/office/mac/drawingml/2011/main" val="1"/>
+              <ma14:wrappingTextBoxFlag xmlns:ma14="http://schemas.microsoft.com/office/mac/drawingml/2011/main" xmlns:a14="http://schemas.microsoft.com/office/drawing/2010/main" xmlns:m="http://schemas.openxmlformats.org/officeDocument/2006/math" xmlns="" val="1"/>
             </a:ext>
           </a:extLst>
         </p:spPr>
@@ -41875,7 +41883,7 @@
           </a:ln>
           <a:extLst>
             <a:ext uri="{C572A759-6A51-4108-AA02-DFA0A04FC94B}">
-              <ma14:wrappingTextBoxFlag xmlns="" xmlns:m="http://schemas.openxmlformats.org/officeDocument/2006/math" xmlns:a14="http://schemas.microsoft.com/office/drawing/2010/main" xmlns:ma14="http://schemas.microsoft.com/office/mac/drawingml/2011/main" val="1"/>
+              <ma14:wrappingTextBoxFlag xmlns:ma14="http://schemas.microsoft.com/office/mac/drawingml/2011/main" xmlns:a14="http://schemas.microsoft.com/office/drawing/2010/main" xmlns:m="http://schemas.openxmlformats.org/officeDocument/2006/math" xmlns="" val="1"/>
             </a:ext>
           </a:extLst>
         </p:spPr>
@@ -42108,7 +42116,7 @@
           </a:ln>
           <a:extLst>
             <a:ext uri="{C572A759-6A51-4108-AA02-DFA0A04FC94B}">
-              <ma14:wrappingTextBoxFlag xmlns="" xmlns:m="http://schemas.openxmlformats.org/officeDocument/2006/math" xmlns:a14="http://schemas.microsoft.com/office/drawing/2010/main" xmlns:ma14="http://schemas.microsoft.com/office/mac/drawingml/2011/main" val="1"/>
+              <ma14:wrappingTextBoxFlag xmlns:ma14="http://schemas.microsoft.com/office/mac/drawingml/2011/main" xmlns:a14="http://schemas.microsoft.com/office/drawing/2010/main" xmlns:m="http://schemas.openxmlformats.org/officeDocument/2006/math" xmlns="" val="1"/>
             </a:ext>
           </a:extLst>
         </p:spPr>
@@ -42156,7 +42164,7 @@
           </a:ln>
           <a:extLst>
             <a:ext uri="{C572A759-6A51-4108-AA02-DFA0A04FC94B}">
-              <ma14:wrappingTextBoxFlag xmlns="" xmlns:m="http://schemas.openxmlformats.org/officeDocument/2006/math" xmlns:a14="http://schemas.microsoft.com/office/drawing/2010/main" xmlns:ma14="http://schemas.microsoft.com/office/mac/drawingml/2011/main" val="1"/>
+              <ma14:wrappingTextBoxFlag xmlns:ma14="http://schemas.microsoft.com/office/mac/drawingml/2011/main" xmlns:a14="http://schemas.microsoft.com/office/drawing/2010/main" xmlns:m="http://schemas.openxmlformats.org/officeDocument/2006/math" xmlns="" val="1"/>
             </a:ext>
           </a:extLst>
         </p:spPr>
@@ -42469,7 +42477,7 @@
           </a:ln>
           <a:extLst>
             <a:ext uri="{C572A759-6A51-4108-AA02-DFA0A04FC94B}">
-              <ma14:wrappingTextBoxFlag xmlns="" xmlns:m="http://schemas.openxmlformats.org/officeDocument/2006/math" xmlns:a14="http://schemas.microsoft.com/office/drawing/2010/main" xmlns:ma14="http://schemas.microsoft.com/office/mac/drawingml/2011/main" val="1"/>
+              <ma14:wrappingTextBoxFlag xmlns:ma14="http://schemas.microsoft.com/office/mac/drawingml/2011/main" xmlns:a14="http://schemas.microsoft.com/office/drawing/2010/main" xmlns:m="http://schemas.openxmlformats.org/officeDocument/2006/math" xmlns="" val="1"/>
             </a:ext>
           </a:extLst>
         </p:spPr>
@@ -47754,7 +47762,7 @@
           </a:ln>
           <a:extLst>
             <a:ext uri="{C572A759-6A51-4108-AA02-DFA0A04FC94B}">
-              <ma14:wrappingTextBoxFlag xmlns="" xmlns:m="http://schemas.openxmlformats.org/officeDocument/2006/math" xmlns:a14="http://schemas.microsoft.com/office/drawing/2010/main" xmlns:ma14="http://schemas.microsoft.com/office/mac/drawingml/2011/main" val="1"/>
+              <ma14:wrappingTextBoxFlag xmlns:ma14="http://schemas.microsoft.com/office/mac/drawingml/2011/main" xmlns:a14="http://schemas.microsoft.com/office/drawing/2010/main" xmlns:m="http://schemas.openxmlformats.org/officeDocument/2006/math" xmlns="" val="1"/>
             </a:ext>
           </a:extLst>
         </p:spPr>
@@ -48153,7 +48161,7 @@
           </a:ln>
           <a:extLst>
             <a:ext uri="{C572A759-6A51-4108-AA02-DFA0A04FC94B}">
-              <ma14:wrappingTextBoxFlag xmlns="" xmlns:m="http://schemas.openxmlformats.org/officeDocument/2006/math" xmlns:a14="http://schemas.microsoft.com/office/drawing/2010/main" xmlns:ma14="http://schemas.microsoft.com/office/mac/drawingml/2011/main" val="1"/>
+              <ma14:wrappingTextBoxFlag xmlns:ma14="http://schemas.microsoft.com/office/mac/drawingml/2011/main" xmlns:a14="http://schemas.microsoft.com/office/drawing/2010/main" xmlns:m="http://schemas.openxmlformats.org/officeDocument/2006/math" xmlns="" val="1"/>
             </a:ext>
           </a:extLst>
         </p:spPr>
@@ -48201,7 +48209,7 @@
           </a:ln>
           <a:extLst>
             <a:ext uri="{C572A759-6A51-4108-AA02-DFA0A04FC94B}">
-              <ma14:wrappingTextBoxFlag xmlns="" xmlns:m="http://schemas.openxmlformats.org/officeDocument/2006/math" xmlns:a14="http://schemas.microsoft.com/office/drawing/2010/main" xmlns:ma14="http://schemas.microsoft.com/office/mac/drawingml/2011/main" val="1"/>
+              <ma14:wrappingTextBoxFlag xmlns:ma14="http://schemas.microsoft.com/office/mac/drawingml/2011/main" xmlns:a14="http://schemas.microsoft.com/office/drawing/2010/main" xmlns:m="http://schemas.openxmlformats.org/officeDocument/2006/math" xmlns="" val="1"/>
             </a:ext>
           </a:extLst>
         </p:spPr>
@@ -48249,7 +48257,7 @@
           </a:ln>
           <a:extLst>
             <a:ext uri="{C572A759-6A51-4108-AA02-DFA0A04FC94B}">
-              <ma14:wrappingTextBoxFlag xmlns="" xmlns:m="http://schemas.openxmlformats.org/officeDocument/2006/math" xmlns:a14="http://schemas.microsoft.com/office/drawing/2010/main" xmlns:ma14="http://schemas.microsoft.com/office/mac/drawingml/2011/main" val="1"/>
+              <ma14:wrappingTextBoxFlag xmlns:ma14="http://schemas.microsoft.com/office/mac/drawingml/2011/main" xmlns:a14="http://schemas.microsoft.com/office/drawing/2010/main" xmlns:m="http://schemas.openxmlformats.org/officeDocument/2006/math" xmlns="" val="1"/>
             </a:ext>
           </a:extLst>
         </p:spPr>
@@ -48482,7 +48490,7 @@
           </a:ln>
           <a:extLst>
             <a:ext uri="{C572A759-6A51-4108-AA02-DFA0A04FC94B}">
-              <ma14:wrappingTextBoxFlag xmlns="" xmlns:m="http://schemas.openxmlformats.org/officeDocument/2006/math" xmlns:a14="http://schemas.microsoft.com/office/drawing/2010/main" xmlns:ma14="http://schemas.microsoft.com/office/mac/drawingml/2011/main" val="1"/>
+              <ma14:wrappingTextBoxFlag xmlns:ma14="http://schemas.microsoft.com/office/mac/drawingml/2011/main" xmlns:a14="http://schemas.microsoft.com/office/drawing/2010/main" xmlns:m="http://schemas.openxmlformats.org/officeDocument/2006/math" xmlns="" val="1"/>
             </a:ext>
           </a:extLst>
         </p:spPr>
@@ -48530,7 +48538,7 @@
           </a:ln>
           <a:extLst>
             <a:ext uri="{C572A759-6A51-4108-AA02-DFA0A04FC94B}">
-              <ma14:wrappingTextBoxFlag xmlns="" xmlns:m="http://schemas.openxmlformats.org/officeDocument/2006/math" xmlns:a14="http://schemas.microsoft.com/office/drawing/2010/main" xmlns:ma14="http://schemas.microsoft.com/office/mac/drawingml/2011/main" val="1"/>
+              <ma14:wrappingTextBoxFlag xmlns:ma14="http://schemas.microsoft.com/office/mac/drawingml/2011/main" xmlns:a14="http://schemas.microsoft.com/office/drawing/2010/main" xmlns:m="http://schemas.openxmlformats.org/officeDocument/2006/math" xmlns="" val="1"/>
             </a:ext>
           </a:extLst>
         </p:spPr>
@@ -48843,7 +48851,7 @@
           </a:ln>
           <a:extLst>
             <a:ext uri="{C572A759-6A51-4108-AA02-DFA0A04FC94B}">
-              <ma14:wrappingTextBoxFlag xmlns="" xmlns:m="http://schemas.openxmlformats.org/officeDocument/2006/math" xmlns:a14="http://schemas.microsoft.com/office/drawing/2010/main" xmlns:ma14="http://schemas.microsoft.com/office/mac/drawingml/2011/main" val="1"/>
+              <ma14:wrappingTextBoxFlag xmlns:ma14="http://schemas.microsoft.com/office/mac/drawingml/2011/main" xmlns:a14="http://schemas.microsoft.com/office/drawing/2010/main" xmlns:m="http://schemas.openxmlformats.org/officeDocument/2006/math" xmlns="" val="1"/>
             </a:ext>
           </a:extLst>
         </p:spPr>
@@ -50160,7 +50168,7 @@
           </a:ln>
           <a:extLst>
             <a:ext uri="{C572A759-6A51-4108-AA02-DFA0A04FC94B}">
-              <ma14:wrappingTextBoxFlag xmlns="" xmlns:m="http://schemas.openxmlformats.org/officeDocument/2006/math" xmlns:a14="http://schemas.microsoft.com/office/drawing/2010/main" xmlns:ma14="http://schemas.microsoft.com/office/mac/drawingml/2011/main" val="1"/>
+              <ma14:wrappingTextBoxFlag xmlns:ma14="http://schemas.microsoft.com/office/mac/drawingml/2011/main" xmlns:a14="http://schemas.microsoft.com/office/drawing/2010/main" xmlns:m="http://schemas.openxmlformats.org/officeDocument/2006/math" xmlns="" val="1"/>
             </a:ext>
           </a:extLst>
         </p:spPr>
@@ -50643,7 +50651,7 @@
           </a:ln>
           <a:extLst>
             <a:ext uri="{C572A759-6A51-4108-AA02-DFA0A04FC94B}">
-              <ma14:wrappingTextBoxFlag xmlns="" xmlns:m="http://schemas.openxmlformats.org/officeDocument/2006/math" xmlns:a14="http://schemas.microsoft.com/office/drawing/2010/main" xmlns:ma14="http://schemas.microsoft.com/office/mac/drawingml/2011/main" val="1"/>
+              <ma14:wrappingTextBoxFlag xmlns:ma14="http://schemas.microsoft.com/office/mac/drawingml/2011/main" xmlns:a14="http://schemas.microsoft.com/office/drawing/2010/main" xmlns:m="http://schemas.openxmlformats.org/officeDocument/2006/math" xmlns="" val="1"/>
             </a:ext>
           </a:extLst>
         </p:spPr>
@@ -50697,7 +50705,7 @@
           </a:ln>
           <a:extLst>
             <a:ext uri="{C572A759-6A51-4108-AA02-DFA0A04FC94B}">
-              <ma14:wrappingTextBoxFlag xmlns="" xmlns:m="http://schemas.openxmlformats.org/officeDocument/2006/math" xmlns:a14="http://schemas.microsoft.com/office/drawing/2010/main" xmlns:ma14="http://schemas.microsoft.com/office/mac/drawingml/2011/main" val="1"/>
+              <ma14:wrappingTextBoxFlag xmlns:ma14="http://schemas.microsoft.com/office/mac/drawingml/2011/main" xmlns:a14="http://schemas.microsoft.com/office/drawing/2010/main" xmlns:m="http://schemas.openxmlformats.org/officeDocument/2006/math" xmlns="" val="1"/>
             </a:ext>
           </a:extLst>
         </p:spPr>
@@ -50751,7 +50759,7 @@
           </a:ln>
           <a:extLst>
             <a:ext uri="{C572A759-6A51-4108-AA02-DFA0A04FC94B}">
-              <ma14:wrappingTextBoxFlag xmlns="" xmlns:m="http://schemas.openxmlformats.org/officeDocument/2006/math" xmlns:a14="http://schemas.microsoft.com/office/drawing/2010/main" xmlns:ma14="http://schemas.microsoft.com/office/mac/drawingml/2011/main" val="1"/>
+              <ma14:wrappingTextBoxFlag xmlns:ma14="http://schemas.microsoft.com/office/mac/drawingml/2011/main" xmlns:a14="http://schemas.microsoft.com/office/drawing/2010/main" xmlns:m="http://schemas.openxmlformats.org/officeDocument/2006/math" xmlns="" val="1"/>
             </a:ext>
           </a:extLst>
         </p:spPr>
@@ -51032,7 +51040,7 @@
           </a:ln>
           <a:extLst>
             <a:ext uri="{C572A759-6A51-4108-AA02-DFA0A04FC94B}">
-              <ma14:wrappingTextBoxFlag xmlns="" xmlns:m="http://schemas.openxmlformats.org/officeDocument/2006/math" xmlns:a14="http://schemas.microsoft.com/office/drawing/2010/main" xmlns:ma14="http://schemas.microsoft.com/office/mac/drawingml/2011/main" val="1"/>
+              <ma14:wrappingTextBoxFlag xmlns:ma14="http://schemas.microsoft.com/office/mac/drawingml/2011/main" xmlns:a14="http://schemas.microsoft.com/office/drawing/2010/main" xmlns:m="http://schemas.openxmlformats.org/officeDocument/2006/math" xmlns="" val="1"/>
             </a:ext>
           </a:extLst>
         </p:spPr>
@@ -51086,7 +51094,7 @@
           </a:ln>
           <a:extLst>
             <a:ext uri="{C572A759-6A51-4108-AA02-DFA0A04FC94B}">
-              <ma14:wrappingTextBoxFlag xmlns="" xmlns:m="http://schemas.openxmlformats.org/officeDocument/2006/math" xmlns:a14="http://schemas.microsoft.com/office/drawing/2010/main" xmlns:ma14="http://schemas.microsoft.com/office/mac/drawingml/2011/main" val="1"/>
+              <ma14:wrappingTextBoxFlag xmlns:ma14="http://schemas.microsoft.com/office/mac/drawingml/2011/main" xmlns:a14="http://schemas.microsoft.com/office/drawing/2010/main" xmlns:m="http://schemas.openxmlformats.org/officeDocument/2006/math" xmlns="" val="1"/>
             </a:ext>
           </a:extLst>
         </p:spPr>
@@ -51465,7 +51473,7 @@
           </a:ln>
           <a:extLst>
             <a:ext uri="{C572A759-6A51-4108-AA02-DFA0A04FC94B}">
-              <ma14:wrappingTextBoxFlag xmlns="" xmlns:m="http://schemas.openxmlformats.org/officeDocument/2006/math" xmlns:a14="http://schemas.microsoft.com/office/drawing/2010/main" xmlns:ma14="http://schemas.microsoft.com/office/mac/drawingml/2011/main" val="1"/>
+              <ma14:wrappingTextBoxFlag xmlns:ma14="http://schemas.microsoft.com/office/mac/drawingml/2011/main" xmlns:a14="http://schemas.microsoft.com/office/drawing/2010/main" xmlns:m="http://schemas.openxmlformats.org/officeDocument/2006/math" xmlns="" val="1"/>
             </a:ext>
           </a:extLst>
         </p:spPr>
@@ -52424,7 +52432,7 @@
           </a:ln>
           <a:extLst>
             <a:ext uri="{C572A759-6A51-4108-AA02-DFA0A04FC94B}">
-              <ma14:wrappingTextBoxFlag xmlns="" xmlns:m="http://schemas.openxmlformats.org/officeDocument/2006/math" xmlns:a14="http://schemas.microsoft.com/office/drawing/2010/main" xmlns:ma14="http://schemas.microsoft.com/office/mac/drawingml/2011/main" val="1"/>
+              <ma14:wrappingTextBoxFlag xmlns:ma14="http://schemas.microsoft.com/office/mac/drawingml/2011/main" xmlns:a14="http://schemas.microsoft.com/office/drawing/2010/main" xmlns:m="http://schemas.openxmlformats.org/officeDocument/2006/math" xmlns="" val="1"/>
             </a:ext>
           </a:extLst>
         </p:spPr>
@@ -52618,7 +52626,7 @@
             <a:effectLst/>
             <a:extLst>
               <a:ext uri="{C572A759-6A51-4108-AA02-DFA0A04FC94B}">
-                <ma14:wrappingTextBoxFlag xmlns="" xmlns:m="http://schemas.openxmlformats.org/officeDocument/2006/math" xmlns:a14="http://schemas.microsoft.com/office/drawing/2010/main" xmlns:ma14="http://schemas.microsoft.com/office/mac/drawingml/2011/main" val="1"/>
+                <ma14:wrappingTextBoxFlag xmlns:ma14="http://schemas.microsoft.com/office/mac/drawingml/2011/main" xmlns:a14="http://schemas.microsoft.com/office/drawing/2010/main" xmlns:m="http://schemas.openxmlformats.org/officeDocument/2006/math" xmlns="" val="1"/>
               </a:ext>
             </a:extLst>
           </p:spPr>
@@ -52728,7 +52736,7 @@
             <a:effectLst/>
             <a:extLst>
               <a:ext uri="{C572A759-6A51-4108-AA02-DFA0A04FC94B}">
-                <ma14:wrappingTextBoxFlag xmlns="" xmlns:m="http://schemas.openxmlformats.org/officeDocument/2006/math" xmlns:a14="http://schemas.microsoft.com/office/drawing/2010/main" xmlns:ma14="http://schemas.microsoft.com/office/mac/drawingml/2011/main" val="1"/>
+                <ma14:wrappingTextBoxFlag xmlns:ma14="http://schemas.microsoft.com/office/mac/drawingml/2011/main" xmlns:a14="http://schemas.microsoft.com/office/drawing/2010/main" xmlns:m="http://schemas.openxmlformats.org/officeDocument/2006/math" xmlns="" val="1"/>
               </a:ext>
             </a:extLst>
           </p:spPr>
@@ -52838,7 +52846,7 @@
             <a:effectLst/>
             <a:extLst>
               <a:ext uri="{C572A759-6A51-4108-AA02-DFA0A04FC94B}">
-                <ma14:wrappingTextBoxFlag xmlns="" xmlns:m="http://schemas.openxmlformats.org/officeDocument/2006/math" xmlns:a14="http://schemas.microsoft.com/office/drawing/2010/main" xmlns:ma14="http://schemas.microsoft.com/office/mac/drawingml/2011/main" val="1"/>
+                <ma14:wrappingTextBoxFlag xmlns:ma14="http://schemas.microsoft.com/office/mac/drawingml/2011/main" xmlns:a14="http://schemas.microsoft.com/office/drawing/2010/main" xmlns:m="http://schemas.openxmlformats.org/officeDocument/2006/math" xmlns="" val="1"/>
               </a:ext>
             </a:extLst>
           </p:spPr>
@@ -52948,7 +52956,7 @@
             <a:effectLst/>
             <a:extLst>
               <a:ext uri="{C572A759-6A51-4108-AA02-DFA0A04FC94B}">
-                <ma14:wrappingTextBoxFlag xmlns="" xmlns:m="http://schemas.openxmlformats.org/officeDocument/2006/math" xmlns:a14="http://schemas.microsoft.com/office/drawing/2010/main" xmlns:ma14="http://schemas.microsoft.com/office/mac/drawingml/2011/main" val="1"/>
+                <ma14:wrappingTextBoxFlag xmlns:ma14="http://schemas.microsoft.com/office/mac/drawingml/2011/main" xmlns:a14="http://schemas.microsoft.com/office/drawing/2010/main" xmlns:m="http://schemas.openxmlformats.org/officeDocument/2006/math" xmlns="" val="1"/>
               </a:ext>
             </a:extLst>
           </p:spPr>
@@ -53058,7 +53066,7 @@
             <a:effectLst/>
             <a:extLst>
               <a:ext uri="{C572A759-6A51-4108-AA02-DFA0A04FC94B}">
-                <ma14:wrappingTextBoxFlag xmlns="" xmlns:m="http://schemas.openxmlformats.org/officeDocument/2006/math" xmlns:a14="http://schemas.microsoft.com/office/drawing/2010/main" xmlns:ma14="http://schemas.microsoft.com/office/mac/drawingml/2011/main" val="1"/>
+                <ma14:wrappingTextBoxFlag xmlns:ma14="http://schemas.microsoft.com/office/mac/drawingml/2011/main" xmlns:a14="http://schemas.microsoft.com/office/drawing/2010/main" xmlns:m="http://schemas.openxmlformats.org/officeDocument/2006/math" xmlns="" val="1"/>
               </a:ext>
             </a:extLst>
           </p:spPr>
@@ -53168,7 +53176,7 @@
             <a:effectLst/>
             <a:extLst>
               <a:ext uri="{C572A759-6A51-4108-AA02-DFA0A04FC94B}">
-                <ma14:wrappingTextBoxFlag xmlns="" xmlns:m="http://schemas.openxmlformats.org/officeDocument/2006/math" xmlns:a14="http://schemas.microsoft.com/office/drawing/2010/main" xmlns:ma14="http://schemas.microsoft.com/office/mac/drawingml/2011/main" val="1"/>
+                <ma14:wrappingTextBoxFlag xmlns:ma14="http://schemas.microsoft.com/office/mac/drawingml/2011/main" xmlns:a14="http://schemas.microsoft.com/office/drawing/2010/main" xmlns:m="http://schemas.openxmlformats.org/officeDocument/2006/math" xmlns="" val="1"/>
               </a:ext>
             </a:extLst>
           </p:spPr>
@@ -54073,7 +54081,7 @@
           </a:ln>
           <a:extLst>
             <a:ext uri="{C572A759-6A51-4108-AA02-DFA0A04FC94B}">
-              <ma14:wrappingTextBoxFlag xmlns="" xmlns:m="http://schemas.openxmlformats.org/officeDocument/2006/math" xmlns:a14="http://schemas.microsoft.com/office/drawing/2010/main" xmlns:ma14="http://schemas.microsoft.com/office/mac/drawingml/2011/main" val="1"/>
+              <ma14:wrappingTextBoxFlag xmlns:ma14="http://schemas.microsoft.com/office/mac/drawingml/2011/main" xmlns:a14="http://schemas.microsoft.com/office/drawing/2010/main" xmlns:m="http://schemas.openxmlformats.org/officeDocument/2006/math" xmlns="" val="1"/>
             </a:ext>
           </a:extLst>
         </p:spPr>
@@ -54125,7 +54133,7 @@
           </a:ln>
           <a:extLst>
             <a:ext uri="{C572A759-6A51-4108-AA02-DFA0A04FC94B}">
-              <ma14:wrappingTextBoxFlag xmlns="" xmlns:m="http://schemas.openxmlformats.org/officeDocument/2006/math" xmlns:a14="http://schemas.microsoft.com/office/drawing/2010/main" xmlns:ma14="http://schemas.microsoft.com/office/mac/drawingml/2011/main" val="1"/>
+              <ma14:wrappingTextBoxFlag xmlns:ma14="http://schemas.microsoft.com/office/mac/drawingml/2011/main" xmlns:a14="http://schemas.microsoft.com/office/drawing/2010/main" xmlns:m="http://schemas.openxmlformats.org/officeDocument/2006/math" xmlns="" val="1"/>
             </a:ext>
           </a:extLst>
         </p:spPr>
@@ -54180,7 +54188,7 @@
           </a:ln>
           <a:extLst>
             <a:ext uri="{C572A759-6A51-4108-AA02-DFA0A04FC94B}">
-              <ma14:wrappingTextBoxFlag xmlns="" xmlns:m="http://schemas.openxmlformats.org/officeDocument/2006/math" xmlns:a14="http://schemas.microsoft.com/office/drawing/2010/main" xmlns:ma14="http://schemas.microsoft.com/office/mac/drawingml/2011/main" val="1"/>
+              <ma14:wrappingTextBoxFlag xmlns:ma14="http://schemas.microsoft.com/office/mac/drawingml/2011/main" xmlns:a14="http://schemas.microsoft.com/office/drawing/2010/main" xmlns:m="http://schemas.openxmlformats.org/officeDocument/2006/math" xmlns="" val="1"/>
             </a:ext>
           </a:extLst>
         </p:spPr>

</xml_diff>